<commit_message>
Ediçoes na apresentação trabalho Complexidade 3
</commit_message>
<xml_diff>
--- a/3SAT- 2.0.pptx
+++ b/3SAT- 2.0.pptx
@@ -29,6 +29,7 @@
     <p:sldId id="278" r:id="rId22"/>
     <p:sldId id="279" r:id="rId23"/>
     <p:sldId id="270" r:id="rId24"/>
+    <p:sldId id="302" r:id="rId25"/>
   </p:sldIdLst>
   <p:sldSz cx="9144000" cy="5143500"/>
   <p:notesSz cx="6858000" cy="9144000"/>
@@ -11972,26 +11973,50 @@
               <a:buNone/>
             </a:pPr>
             <a:r>
-              <a:rPr lang="pt-BR" sz="1600"/>
+              <a:rPr lang="pt-BR" sz="1600">
+                <a:solidFill>
+                  <a:schemeClr val="tx1"/>
+                </a:solidFill>
+              </a:rPr>
               <a:t>FNC - E</a:t>
             </a:r>
             <a:r>
-              <a:rPr lang="en-US" altLang="pt-BR" sz="1600"/>
+              <a:rPr lang="en-US" altLang="pt-BR" sz="1600">
+                <a:solidFill>
+                  <a:schemeClr val="tx1"/>
+                </a:solidFill>
+              </a:rPr>
               <a:t>xpressão</a:t>
             </a:r>
             <a:r>
-              <a:rPr lang="pt-BR" sz="1600"/>
+              <a:rPr lang="pt-BR" sz="1600">
+                <a:solidFill>
+                  <a:schemeClr val="tx1"/>
+                </a:solidFill>
+              </a:rPr>
               <a:t> booleana com operações </a:t>
             </a:r>
             <a:r>
-              <a:rPr lang="en-US" altLang="pt-BR" sz="1600"/>
+              <a:rPr lang="en-US" altLang="pt-BR" sz="1600">
+                <a:solidFill>
+                  <a:schemeClr val="tx1"/>
+                </a:solidFill>
+              </a:rPr>
               <a:t>de</a:t>
             </a:r>
             <a:r>
-              <a:rPr lang="pt-BR" sz="1600"/>
+              <a:rPr lang="pt-BR" sz="1600">
+                <a:solidFill>
+                  <a:schemeClr val="tx1"/>
+                </a:solidFill>
+              </a:rPr>
               <a:t> conjunção, disjunção e negação: </a:t>
             </a:r>
-            <a:endParaRPr lang="pt-BR" sz="1600"/>
+            <a:endParaRPr lang="pt-BR" sz="1600">
+              <a:solidFill>
+                <a:schemeClr val="tx1"/>
+              </a:solidFill>
+            </a:endParaRPr>
           </a:p>
           <a:p>
             <a:pPr lvl="0" algn="l" rtl="0">
@@ -12009,10 +12034,18 @@
               <a:buChar char="•"/>
             </a:pPr>
             <a:r>
-              <a:rPr lang="pt-BR" sz="1600"/>
+              <a:rPr lang="pt-BR" sz="1600">
+                <a:solidFill>
+                  <a:schemeClr val="tx1"/>
+                </a:solidFill>
+              </a:rPr>
               <a:t>É constituı́da por uma conjunção de uma ou mais cláusulas.</a:t>
             </a:r>
-            <a:endParaRPr lang="pt-BR" sz="1600"/>
+            <a:endParaRPr lang="pt-BR" sz="1600">
+              <a:solidFill>
+                <a:schemeClr val="tx1"/>
+              </a:solidFill>
+            </a:endParaRPr>
           </a:p>
           <a:p>
             <a:pPr lvl="0" algn="l" rtl="0">
@@ -12030,10 +12063,18 @@
               <a:buChar char="•"/>
             </a:pPr>
             <a:r>
-              <a:rPr lang="pt-BR" sz="1600"/>
+              <a:rPr lang="pt-BR" sz="1600">
+                <a:solidFill>
+                  <a:schemeClr val="tx1"/>
+                </a:solidFill>
+              </a:rPr>
               <a:t>Cada cláusula é constituı́da por disjunções de um ou mais literais;</a:t>
             </a:r>
-            <a:endParaRPr lang="pt-BR" sz="1600"/>
+            <a:endParaRPr lang="pt-BR" sz="1600">
+              <a:solidFill>
+                <a:schemeClr val="tx1"/>
+              </a:solidFill>
+            </a:endParaRPr>
           </a:p>
           <a:p>
             <a:pPr lvl="0" algn="l" rtl="0">
@@ -12051,7 +12092,11 @@
               <a:buChar char="•"/>
             </a:pPr>
             <a:r>
-              <a:rPr lang="pt-BR" sz="1600"/>
+              <a:rPr lang="pt-BR" sz="1600">
+                <a:solidFill>
+                  <a:schemeClr val="tx1"/>
+                </a:solidFill>
+              </a:rPr>
               <a:t>Um literal é uma ocorrência da variável, podendo ser a própria variável ou seu complemento.</a:t>
             </a:r>
             <a:endParaRPr lang="pt-BR"/>
@@ -12069,6 +12114,245 @@
               </a:spcAft>
               <a:buNone/>
             </a:pPr>
+          </a:p>
+          <a:p>
+            <a:pPr marL="0" lvl="0" indent="0" algn="ctr" rtl="0">
+              <a:lnSpc>
+                <a:spcPct val="100000"/>
+              </a:lnSpc>
+              <a:spcBef>
+                <a:spcPts val="1600"/>
+              </a:spcBef>
+              <a:spcAft>
+                <a:spcPts val="0"/>
+              </a:spcAft>
+              <a:buNone/>
+            </a:pPr>
+            <a:r>
+              <a:rPr lang="en-US" altLang="en-US">
+                <a:solidFill>
+                  <a:schemeClr val="tx1"/>
+                </a:solidFill>
+                <a:sym typeface="+mn-ea"/>
+              </a:rPr>
+              <a:t>(x</a:t>
+            </a:r>
+            <a:r>
+              <a:rPr lang="en-US" altLang="en-US" baseline="-25000">
+                <a:solidFill>
+                  <a:schemeClr val="tx1"/>
+                </a:solidFill>
+                <a:sym typeface="+mn-ea"/>
+              </a:rPr>
+              <a:t>0</a:t>
+            </a:r>
+            <a:r>
+              <a:rPr lang="en-US" altLang="en-US">
+                <a:solidFill>
+                  <a:schemeClr val="tx1"/>
+                </a:solidFill>
+                <a:sym typeface="+mn-ea"/>
+              </a:rPr>
+              <a:t> V x</a:t>
+            </a:r>
+            <a:r>
+              <a:rPr lang="en-US" altLang="en-US" baseline="-25000">
+                <a:solidFill>
+                  <a:schemeClr val="tx1"/>
+                </a:solidFill>
+                <a:sym typeface="+mn-ea"/>
+              </a:rPr>
+              <a:t>1</a:t>
+            </a:r>
+            <a:r>
+              <a:rPr lang="en-US" altLang="en-US">
+                <a:solidFill>
+                  <a:schemeClr val="tx1"/>
+                </a:solidFill>
+                <a:sym typeface="+mn-ea"/>
+              </a:rPr>
+              <a:t>) /\ (!x</a:t>
+            </a:r>
+            <a:r>
+              <a:rPr lang="en-US" altLang="en-US" baseline="-25000">
+                <a:solidFill>
+                  <a:schemeClr val="tx1"/>
+                </a:solidFill>
+                <a:sym typeface="+mn-ea"/>
+              </a:rPr>
+              <a:t>0</a:t>
+            </a:r>
+            <a:r>
+              <a:rPr lang="en-US" altLang="en-US">
+                <a:solidFill>
+                  <a:schemeClr val="tx1"/>
+                </a:solidFill>
+                <a:sym typeface="+mn-ea"/>
+              </a:rPr>
+              <a:t> V !x</a:t>
+            </a:r>
+            <a:r>
+              <a:rPr lang="en-US" altLang="en-US" baseline="-25000">
+                <a:solidFill>
+                  <a:schemeClr val="tx1"/>
+                </a:solidFill>
+                <a:sym typeface="+mn-ea"/>
+              </a:rPr>
+              <a:t>1</a:t>
+            </a:r>
+            <a:r>
+              <a:rPr lang="en-US" altLang="en-US">
+                <a:solidFill>
+                  <a:schemeClr val="tx1"/>
+                </a:solidFill>
+                <a:sym typeface="+mn-ea"/>
+              </a:rPr>
+              <a:t> V x</a:t>
+            </a:r>
+            <a:r>
+              <a:rPr lang="en-US" altLang="en-US" baseline="-25000">
+                <a:solidFill>
+                  <a:schemeClr val="tx1"/>
+                </a:solidFill>
+                <a:sym typeface="+mn-ea"/>
+              </a:rPr>
+              <a:t>3</a:t>
+            </a:r>
+            <a:r>
+              <a:rPr lang="en-US" altLang="en-US">
+                <a:solidFill>
+                  <a:schemeClr val="tx1"/>
+                </a:solidFill>
+                <a:sym typeface="+mn-ea"/>
+              </a:rPr>
+              <a:t>) /\ (!x</a:t>
+            </a:r>
+            <a:r>
+              <a:rPr lang="en-US" altLang="en-US" baseline="-25000">
+                <a:solidFill>
+                  <a:schemeClr val="tx1"/>
+                </a:solidFill>
+                <a:sym typeface="+mn-ea"/>
+              </a:rPr>
+              <a:t>0</a:t>
+            </a:r>
+            <a:r>
+              <a:rPr lang="en-US" altLang="en-US">
+                <a:solidFill>
+                  <a:schemeClr val="tx1"/>
+                </a:solidFill>
+                <a:sym typeface="+mn-ea"/>
+              </a:rPr>
+              <a:t>) </a:t>
+            </a:r>
+            <a:r>
+              <a:rPr lang="" altLang="en-US">
+                <a:solidFill>
+                  <a:schemeClr val="tx1"/>
+                </a:solidFill>
+                <a:sym typeface="+mn-ea"/>
+              </a:rPr>
+              <a:t>/\ </a:t>
+            </a:r>
+            <a:r>
+              <a:rPr lang="en-US" altLang="en-US">
+                <a:solidFill>
+                  <a:schemeClr val="tx1"/>
+                </a:solidFill>
+                <a:sym typeface="+mn-ea"/>
+              </a:rPr>
+              <a:t>(!x</a:t>
+            </a:r>
+            <a:r>
+              <a:rPr lang="en-US" altLang="en-US" baseline="-25000">
+                <a:solidFill>
+                  <a:schemeClr val="tx1"/>
+                </a:solidFill>
+                <a:sym typeface="+mn-ea"/>
+              </a:rPr>
+              <a:t>0</a:t>
+            </a:r>
+            <a:r>
+              <a:rPr lang="en-US" altLang="en-US">
+                <a:solidFill>
+                  <a:schemeClr val="tx1"/>
+                </a:solidFill>
+                <a:sym typeface="+mn-ea"/>
+              </a:rPr>
+              <a:t> </a:t>
+            </a:r>
+            <a:r>
+              <a:rPr lang="" altLang="en-US">
+                <a:solidFill>
+                  <a:schemeClr val="tx1"/>
+                </a:solidFill>
+                <a:sym typeface="+mn-ea"/>
+              </a:rPr>
+              <a:t>V x</a:t>
+            </a:r>
+            <a:r>
+              <a:rPr lang="" altLang="en-US" baseline="-25000">
+                <a:solidFill>
+                  <a:schemeClr val="tx1"/>
+                </a:solidFill>
+                <a:sym typeface="+mn-ea"/>
+              </a:rPr>
+              <a:t>1</a:t>
+            </a:r>
+            <a:r>
+              <a:rPr lang="" altLang="en-US">
+                <a:solidFill>
+                  <a:schemeClr val="tx1"/>
+                </a:solidFill>
+                <a:sym typeface="+mn-ea"/>
+              </a:rPr>
+              <a:t> </a:t>
+            </a:r>
+            <a:r>
+              <a:rPr lang="en-US" altLang="en-US">
+                <a:solidFill>
+                  <a:schemeClr val="tx1"/>
+                </a:solidFill>
+                <a:sym typeface="+mn-ea"/>
+              </a:rPr>
+              <a:t>V !x</a:t>
+            </a:r>
+            <a:r>
+              <a:rPr lang="en-US" altLang="en-US" baseline="-25000">
+                <a:solidFill>
+                  <a:schemeClr val="tx1"/>
+                </a:solidFill>
+                <a:sym typeface="+mn-ea"/>
+              </a:rPr>
+              <a:t>3</a:t>
+            </a:r>
+            <a:r>
+              <a:rPr lang="en-US" altLang="en-US">
+                <a:solidFill>
+                  <a:schemeClr val="tx1"/>
+                </a:solidFill>
+                <a:sym typeface="+mn-ea"/>
+              </a:rPr>
+              <a:t> V !x</a:t>
+            </a:r>
+            <a:r>
+              <a:rPr lang="en-US" altLang="en-US" baseline="-25000">
+                <a:solidFill>
+                  <a:schemeClr val="tx1"/>
+                </a:solidFill>
+                <a:sym typeface="+mn-ea"/>
+              </a:rPr>
+              <a:t>2</a:t>
+            </a:r>
+            <a:r>
+              <a:rPr lang="en-US" altLang="en-US">
+                <a:solidFill>
+                  <a:schemeClr val="tx1"/>
+                </a:solidFill>
+                <a:sym typeface="+mn-ea"/>
+              </a:rPr>
+              <a:t>)</a:t>
+            </a:r>
           </a:p>
           <a:p>
             <a:pPr marL="0" lvl="0" indent="0" algn="l" rtl="0">
@@ -12512,6 +12796,126 @@
 </p:sld>
 </file>
 
+<file path=ppt/slides/slide22.xml><?xml version="1.0" encoding="utf-8"?>
+<p:sld xmlns:a="http://schemas.openxmlformats.org/drawingml/2006/main" xmlns:r="http://schemas.openxmlformats.org/officeDocument/2006/relationships" xmlns:p="http://schemas.openxmlformats.org/presentationml/2006/main" show="0">
+  <p:cSld>
+    <p:spTree>
+      <p:nvGrpSpPr>
+        <p:cNvPr id="1" name=""/>
+        <p:cNvGrpSpPr/>
+        <p:nvPr/>
+      </p:nvGrpSpPr>
+      <p:grpSpPr/>
+      <p:sp>
+        <p:nvSpPr>
+          <p:cNvPr id="2" name="Title 1"/>
+          <p:cNvSpPr/>
+          <p:nvPr>
+            <p:ph type="title"/>
+          </p:nvPr>
+        </p:nvSpPr>
+        <p:spPr/>
+        <p:txBody>
+          <a:bodyPr/>
+          <a:p>
+            <a:r>
+              <a:rPr lang="" altLang="en-US"/>
+              <a:t>Referências</a:t>
+            </a:r>
+            <a:endParaRPr lang="" altLang="en-US"/>
+          </a:p>
+        </p:txBody>
+      </p:sp>
+      <p:sp>
+        <p:nvSpPr>
+          <p:cNvPr id="3" name="Text Placeholder 2"/>
+          <p:cNvSpPr/>
+          <p:nvPr>
+            <p:ph type="body" idx="1"/>
+          </p:nvPr>
+        </p:nvSpPr>
+        <p:spPr/>
+        <p:txBody>
+          <a:bodyPr/>
+          <a:p>
+            <a:pPr marL="114300" indent="0">
+              <a:buNone/>
+            </a:pPr>
+            <a:endParaRPr lang="en-US"/>
+          </a:p>
+          <a:p>
+            <a:pPr marL="114300" indent="0">
+              <a:buNone/>
+            </a:pPr>
+            <a:endParaRPr lang="en-US" sz="1400"/>
+          </a:p>
+          <a:p>
+            <a:pPr>
+              <a:lnSpc>
+                <a:spcPct val="135000"/>
+              </a:lnSpc>
+              <a:buFont typeface="Arial" panose="02080604020202020204" pitchFamily="34" charset="0"/>
+              <a:buChar char="•"/>
+            </a:pPr>
+            <a:r>
+              <a:rPr lang="en-US" sz="1400"/>
+              <a:t>https://pt.wikipedia.org/wiki/Problema_de_satisfatibilidade_booliana</a:t>
+            </a:r>
+            <a:endParaRPr lang="en-US" sz="1400"/>
+          </a:p>
+          <a:p>
+            <a:pPr>
+              <a:lnSpc>
+                <a:spcPct val="135000"/>
+              </a:lnSpc>
+              <a:buFont typeface="Arial" panose="02080604020202020204" pitchFamily="34" charset="0"/>
+              <a:buChar char="•"/>
+            </a:pPr>
+            <a:r>
+              <a:rPr lang="en-US" sz="1400"/>
+              <a:t>http://conteudo.icmc.usp.br/pessoas/andretta/ensino/aulas/sme0216-5826-2-15/aula2-NPcompleto.pdf</a:t>
+            </a:r>
+            <a:endParaRPr lang="en-US" sz="1400"/>
+          </a:p>
+          <a:p>
+            <a:pPr>
+              <a:lnSpc>
+                <a:spcPct val="135000"/>
+              </a:lnSpc>
+              <a:buFont typeface="Arial" panose="02080604020202020204" pitchFamily="34" charset="0"/>
+              <a:buChar char="•"/>
+            </a:pPr>
+            <a:r>
+              <a:rPr lang="en-US" sz="1400"/>
+              <a:t>http://www.cs.cmu.edu/afs/cs.cmu.edu/academic/class/15451-s00/www/lectures/lect0323post.txt</a:t>
+            </a:r>
+            <a:endParaRPr lang="en-US" sz="1400"/>
+          </a:p>
+          <a:p>
+            <a:pPr>
+              <a:lnSpc>
+                <a:spcPct val="135000"/>
+              </a:lnSpc>
+              <a:buFont typeface="Arial" panose="02080604020202020204" pitchFamily="34" charset="0"/>
+              <a:buChar char="•"/>
+            </a:pPr>
+            <a:r>
+              <a:rPr lang="en-US" sz="1400"/>
+              <a:t>http://read.pudn.com/downloads153/doc/669284/3SAT-NP-Completeness.pdf</a:t>
+            </a:r>
+            <a:endParaRPr lang="en-US" sz="1400"/>
+          </a:p>
+        </p:txBody>
+      </p:sp>
+    </p:spTree>
+  </p:cSld>
+  <p:clrMapOvr>
+    <a:masterClrMapping/>
+  </p:clrMapOvr>
+  <p:transition/>
+</p:sld>
+</file>
+
 <file path=ppt/slides/slide3.xml><?xml version="1.0" encoding="utf-8"?>
 <p:sld xmlns:a="http://schemas.openxmlformats.org/drawingml/2006/main" xmlns:r="http://schemas.openxmlformats.org/officeDocument/2006/relationships" xmlns:p="http://schemas.openxmlformats.org/presentationml/2006/main">
   <p:cSld>
@@ -12602,14 +13006,26 @@
               <a:buNone/>
             </a:pPr>
             <a:r>
-              <a:rPr lang="pt-BR" sz="1600"/>
+              <a:rPr lang="pt-BR" sz="1600">
+                <a:solidFill>
+                  <a:schemeClr val="tx1"/>
+                </a:solidFill>
+              </a:rPr>
               <a:t>Problema da Satisfabilidade Booleana (Boolean Satisfiability Problem - SAT)</a:t>
             </a:r>
             <a:r>
-              <a:rPr lang="en-US" altLang="pt-BR" sz="1600"/>
+              <a:rPr lang="en-US" altLang="pt-BR" sz="1600">
+                <a:solidFill>
+                  <a:schemeClr val="tx1"/>
+                </a:solidFill>
+              </a:rPr>
               <a:t>.</a:t>
             </a:r>
-            <a:endParaRPr lang="pt-BR" sz="1600"/>
+            <a:endParaRPr lang="pt-BR" sz="1600">
+              <a:solidFill>
+                <a:schemeClr val="tx1"/>
+              </a:solidFill>
+            </a:endParaRPr>
           </a:p>
           <a:p>
             <a:pPr marL="0" lvl="0" indent="0" algn="l" rtl="0">
@@ -12622,10 +13038,18 @@
               <a:buNone/>
             </a:pPr>
             <a:r>
-              <a:rPr lang="pt-BR" sz="1600"/>
+              <a:rPr lang="pt-BR" sz="1600">
+                <a:solidFill>
+                  <a:schemeClr val="tx1"/>
+                </a:solidFill>
+              </a:rPr>
               <a:t>Problema de decisão e primeiro provado NP-completo.</a:t>
             </a:r>
-            <a:endParaRPr lang="pt-BR" sz="1600"/>
+            <a:endParaRPr lang="pt-BR" sz="1600">
+              <a:solidFill>
+                <a:schemeClr val="tx1"/>
+              </a:solidFill>
+            </a:endParaRPr>
           </a:p>
           <a:p>
             <a:pPr marL="0" lvl="0" indent="457200" algn="l" rtl="0">
@@ -12638,18 +13062,34 @@
               <a:buNone/>
             </a:pPr>
             <a:r>
-              <a:rPr lang="pt-BR" sz="1600"/>
+              <a:rPr lang="pt-BR" sz="1600">
+                <a:solidFill>
+                  <a:schemeClr val="tx1"/>
+                </a:solidFill>
+              </a:rPr>
               <a:t>Dada uma expressão na FNC, ele </a:t>
             </a:r>
             <a:r>
-              <a:rPr lang="en-US" altLang="pt-BR" sz="1600"/>
+              <a:rPr lang="en-US" altLang="pt-BR" sz="1600">
+                <a:solidFill>
+                  <a:schemeClr val="tx1"/>
+                </a:solidFill>
+              </a:rPr>
               <a:t>questiona</a:t>
             </a:r>
             <a:r>
-              <a:rPr lang="pt-BR" sz="1600"/>
+              <a:rPr lang="pt-BR" sz="1600">
+                <a:solidFill>
+                  <a:schemeClr val="tx1"/>
+                </a:solidFill>
+              </a:rPr>
               <a:t> se existe uma combinação de atribuições das variáveis de entrada que torne a expressão satisfazível.</a:t>
             </a:r>
-            <a:endParaRPr lang="pt-BR" sz="1600"/>
+            <a:endParaRPr lang="pt-BR" sz="1600">
+              <a:solidFill>
+                <a:schemeClr val="tx1"/>
+              </a:solidFill>
+            </a:endParaRPr>
           </a:p>
           <a:p>
             <a:pPr marL="0" lvl="0" indent="457200" algn="l" rtl="0">
@@ -12661,7 +13101,11 @@
               </a:spcAft>
               <a:buNone/>
             </a:pPr>
-            <a:endParaRPr lang="pt-BR" sz="1600"/>
+            <a:endParaRPr lang="pt-BR" sz="1600">
+              <a:solidFill>
+                <a:schemeClr val="tx1"/>
+              </a:solidFill>
+            </a:endParaRPr>
           </a:p>
           <a:p>
             <a:pPr marL="0" lvl="0" indent="457200" algn="l" rtl="0">
@@ -12673,7 +13117,11 @@
               </a:spcAft>
               <a:buNone/>
             </a:pPr>
-            <a:endParaRPr lang="pt-BR"/>
+            <a:endParaRPr lang="pt-BR">
+              <a:solidFill>
+                <a:schemeClr val="tx1"/>
+              </a:solidFill>
+            </a:endParaRPr>
           </a:p>
           <a:p>
             <a:pPr marL="0" lvl="0" indent="457200" algn="l" rtl="0">
@@ -12686,35 +13134,67 @@
               <a:buNone/>
             </a:pPr>
             <a:r>
-              <a:rPr lang="pt-BR" sz="1600" i="1"/>
+              <a:rPr lang="pt-BR" sz="1600" i="1">
+                <a:solidFill>
+                  <a:schemeClr val="tx1"/>
+                </a:solidFill>
+              </a:rPr>
               <a:t>**As cláusulas </a:t>
             </a:r>
             <a:r>
-              <a:rPr lang="en-US" altLang="pt-BR" sz="1600" i="1"/>
+              <a:rPr lang="en-US" altLang="pt-BR" sz="1600" i="1">
+                <a:solidFill>
+                  <a:schemeClr val="tx1"/>
+                </a:solidFill>
+              </a:rPr>
               <a:t>da expressão</a:t>
             </a:r>
             <a:r>
-              <a:rPr lang="pt-BR" sz="1600" i="1"/>
+              <a:rPr lang="pt-BR" sz="1600" i="1">
+                <a:solidFill>
+                  <a:schemeClr val="tx1"/>
+                </a:solidFill>
+              </a:rPr>
               <a:t> não </a:t>
             </a:r>
             <a:r>
-              <a:rPr lang="en-US" altLang="pt-BR" sz="1600" i="1"/>
+              <a:rPr lang="en-US" altLang="pt-BR" sz="1600" i="1">
+                <a:solidFill>
+                  <a:schemeClr val="tx1"/>
+                </a:solidFill>
+              </a:rPr>
               <a:t>possuem</a:t>
             </a:r>
             <a:r>
-              <a:rPr lang="pt-BR" sz="1600" i="1"/>
+              <a:rPr lang="pt-BR" sz="1600" i="1">
+                <a:solidFill>
+                  <a:schemeClr val="tx1"/>
+                </a:solidFill>
+              </a:rPr>
               <a:t> um número determinado de literais </a:t>
             </a:r>
             <a:r>
-              <a:rPr lang="en-US" altLang="pt-BR" sz="1600" i="1"/>
+              <a:rPr lang="en-US" altLang="pt-BR" sz="1600" i="1">
+                <a:solidFill>
+                  <a:schemeClr val="tx1"/>
+                </a:solidFill>
+              </a:rPr>
               <a:t>e literais </a:t>
             </a:r>
             <a:r>
-              <a:rPr lang="en-US" altLang="en-US" sz="1600" i="1"/>
+              <a:rPr lang="en-US" altLang="en-US" sz="1600" i="1">
+                <a:solidFill>
+                  <a:schemeClr val="tx1"/>
+                </a:solidFill>
+              </a:rPr>
               <a:t>de</a:t>
             </a:r>
             <a:r>
-              <a:rPr lang="en-US" altLang="pt-BR" sz="1600" i="1"/>
+              <a:rPr lang="en-US" altLang="pt-BR" sz="1600" i="1">
+                <a:solidFill>
+                  <a:schemeClr val="tx1"/>
+                </a:solidFill>
+              </a:rPr>
               <a:t> mesma variável.</a:t>
             </a:r>
             <a:endParaRPr i="1"/>
@@ -12885,18 +13365,34 @@
               <a:buNone/>
             </a:pPr>
             <a:r>
-              <a:rPr lang="pt-BR"/>
+              <a:rPr lang="pt-BR">
+                <a:solidFill>
+                  <a:schemeClr val="tx1"/>
+                </a:solidFill>
+              </a:rPr>
               <a:t>Assemelha-se ao Problema SAT, porém, cada cláusula da FNC possui </a:t>
             </a:r>
             <a:r>
-              <a:rPr lang="pt-BR" b="1"/>
+              <a:rPr lang="pt-BR" b="1">
+                <a:solidFill>
+                  <a:schemeClr val="tx1"/>
+                </a:solidFill>
+              </a:rPr>
               <a:t>somente</a:t>
             </a:r>
             <a:r>
-              <a:rPr lang="pt-BR"/>
+              <a:rPr lang="pt-BR">
+                <a:solidFill>
+                  <a:schemeClr val="tx1"/>
+                </a:solidFill>
+              </a:rPr>
               <a:t> 3 literais.</a:t>
             </a:r>
-            <a:endParaRPr lang="pt-BR"/>
+            <a:endParaRPr lang="pt-BR">
+              <a:solidFill>
+                <a:schemeClr val="tx1"/>
+              </a:solidFill>
+            </a:endParaRPr>
           </a:p>
           <a:p>
             <a:pPr marL="0" lvl="0" indent="0" algn="l" rtl="0">
@@ -12908,7 +13404,11 @@
               </a:spcAft>
               <a:buNone/>
             </a:pPr>
-            <a:endParaRPr lang="pt-BR"/>
+            <a:endParaRPr lang="pt-BR">
+              <a:solidFill>
+                <a:schemeClr val="tx1"/>
+              </a:solidFill>
+            </a:endParaRPr>
           </a:p>
           <a:p>
             <a:pPr marL="0" lvl="0" indent="457200" algn="l" rtl="0">
@@ -12921,25 +13421,44 @@
               <a:buNone/>
             </a:pPr>
             <a:r>
-              <a:rPr lang="pt-BR"/>
+              <a:rPr lang="pt-BR">
+                <a:solidFill>
+                  <a:schemeClr val="tx1"/>
+                </a:solidFill>
+              </a:rPr>
               <a:t>Dada uma FNC </a:t>
             </a:r>
             <a:r>
-              <a:rPr lang="pt-BR" i="1"/>
+              <a:rPr lang="pt-BR" i="1">
+                <a:solidFill>
+                  <a:schemeClr val="tx1"/>
+                </a:solidFill>
+              </a:rPr>
               <a:t>composta por somente 3 literais em cada cláusula</a:t>
             </a:r>
             <a:r>
-              <a:rPr lang="pt-BR"/>
+              <a:rPr lang="pt-BR">
+                <a:solidFill>
+                  <a:schemeClr val="tx1"/>
+                </a:solidFill>
+              </a:rPr>
               <a:t>, ele </a:t>
             </a:r>
             <a:r>
               <a:rPr lang="en-US" altLang="pt-BR">
+                <a:solidFill>
+                  <a:schemeClr val="tx1"/>
+                </a:solidFill>
                 <a:sym typeface="+mn-ea"/>
               </a:rPr>
               <a:t>questiona </a:t>
             </a:r>
             <a:r>
-              <a:rPr lang="pt-BR"/>
+              <a:rPr lang="pt-BR">
+                <a:solidFill>
+                  <a:schemeClr val="tx1"/>
+                </a:solidFill>
+              </a:rPr>
               <a:t>se existe uma combinação de atribuições das variáveis de entrada que torne a expressão satisfazível.</a:t>
             </a:r>
             <a:endParaRPr lang="pt-BR"/>
@@ -13099,14 +13618,26 @@
               <a:buNone/>
             </a:pPr>
             <a:r>
-              <a:rPr lang="en-US" altLang="pt-BR"/>
+              <a:rPr lang="en-US" altLang="pt-BR">
+                <a:solidFill>
+                  <a:schemeClr val="tx1"/>
+                </a:solidFill>
+              </a:rPr>
               <a:t>	</a:t>
             </a:r>
             <a:r>
-              <a:rPr lang="pt-BR"/>
+              <a:rPr lang="pt-BR">
+                <a:solidFill>
+                  <a:schemeClr val="tx1"/>
+                </a:solidFill>
+              </a:rPr>
               <a:t>Para realizar a prova de que 3-SAT pertence a NP, deve-se apresentar um algoritmo de verificação que:</a:t>
             </a:r>
-            <a:endParaRPr lang="pt-BR"/>
+            <a:endParaRPr lang="pt-BR">
+              <a:solidFill>
+                <a:schemeClr val="tx1"/>
+              </a:solidFill>
+            </a:endParaRPr>
           </a:p>
           <a:p>
             <a:pPr marL="0" lvl="0" indent="0" algn="l" rtl="0">
@@ -13118,7 +13649,11 @@
               </a:spcAft>
               <a:buNone/>
             </a:pPr>
-            <a:endParaRPr lang="pt-BR"/>
+            <a:endParaRPr lang="pt-BR">
+              <a:solidFill>
+                <a:schemeClr val="tx1"/>
+              </a:solidFill>
+            </a:endParaRPr>
           </a:p>
           <a:p>
             <a:pPr marL="285750" lvl="0" indent="-285750" algn="l" rtl="0">
@@ -13135,22 +13670,42 @@
               <a:buChar char=""/>
             </a:pPr>
             <a:r>
-              <a:rPr lang="en-US" altLang="pt-BR" sz="1600"/>
+              <a:rPr lang="en-US" altLang="pt-BR" sz="1600">
+                <a:solidFill>
+                  <a:schemeClr val="tx1"/>
+                </a:solidFill>
+              </a:rPr>
               <a:t>d</a:t>
             </a:r>
             <a:r>
-              <a:rPr lang="pt-BR" sz="1600"/>
+              <a:rPr lang="pt-BR" sz="1600">
+                <a:solidFill>
+                  <a:schemeClr val="tx1"/>
+                </a:solidFill>
+              </a:rPr>
               <a:t>ada uma expressão constituída por cl</a:t>
             </a:r>
             <a:r>
-              <a:rPr lang="en-US" altLang="pt-BR" sz="1600"/>
+              <a:rPr lang="en-US" altLang="pt-BR" sz="1600">
+                <a:solidFill>
+                  <a:schemeClr val="tx1"/>
+                </a:solidFill>
+              </a:rPr>
               <a:t>á</a:t>
             </a:r>
             <a:r>
-              <a:rPr lang="pt-BR" sz="1600"/>
+              <a:rPr lang="pt-BR" sz="1600">
+                <a:solidFill>
+                  <a:schemeClr val="tx1"/>
+                </a:solidFill>
+              </a:rPr>
               <a:t>usulas na FNC com 3 literais cada (instância);</a:t>
             </a:r>
-            <a:endParaRPr lang="pt-BR" sz="1600"/>
+            <a:endParaRPr lang="pt-BR" sz="1600">
+              <a:solidFill>
+                <a:schemeClr val="tx1"/>
+              </a:solidFill>
+            </a:endParaRPr>
           </a:p>
           <a:p>
             <a:pPr marL="285750" lvl="0" indent="-285750" algn="l" rtl="0">
@@ -13167,10 +13722,18 @@
               <a:buChar char=""/>
             </a:pPr>
             <a:r>
-              <a:rPr lang="pt-BR" sz="1600"/>
+              <a:rPr lang="pt-BR" sz="1600">
+                <a:solidFill>
+                  <a:schemeClr val="tx1"/>
+                </a:solidFill>
+              </a:rPr>
               <a:t>dado um conjunto de atribuições para cada variável da expressão(certificado);</a:t>
             </a:r>
-            <a:endParaRPr lang="pt-BR" sz="1600"/>
+            <a:endParaRPr lang="pt-BR" sz="1600">
+              <a:solidFill>
+                <a:schemeClr val="tx1"/>
+              </a:solidFill>
+            </a:endParaRPr>
           </a:p>
           <a:p>
             <a:pPr marL="285750" lvl="0" indent="-285750" algn="l" rtl="0">
@@ -13187,7 +13750,11 @@
               <a:buChar char=""/>
             </a:pPr>
             <a:r>
-              <a:rPr lang="pt-BR" sz="1600"/>
+              <a:rPr lang="pt-BR" sz="1600">
+                <a:solidFill>
+                  <a:schemeClr val="tx1"/>
+                </a:solidFill>
+              </a:rPr>
               <a:t>em tempo polinomial, retorna se a avaliação da expressão é satisfazível ou não;  </a:t>
             </a:r>
             <a:endParaRPr lang="pt-BR"/>
@@ -13286,7 +13853,7 @@
               <a:buNone/>
             </a:pPr>
             <a:r>
-              <a:rPr lang="" altLang="en-US">
+              <a:rPr lang="en-US" altLang="en-US">
                 <a:solidFill>
                   <a:schemeClr val="tx1"/>
                 </a:solidFill>
@@ -13294,11 +13861,11 @@
               <a:t>instancia</a:t>
             </a:r>
             <a:r>
-              <a:rPr lang="" altLang="en-US"/>
+              <a:rPr lang="en-US" altLang="en-US"/>
               <a:t> = (</a:t>
             </a:r>
             <a:r>
-              <a:rPr lang="" altLang="en-US">
+              <a:rPr lang="en-US" altLang="en-US">
                 <a:solidFill>
                   <a:schemeClr val="accent1">
                     <a:lumMod val="60000"/>
@@ -13309,7 +13876,7 @@
               <a:t>x</a:t>
             </a:r>
             <a:r>
-              <a:rPr lang="" altLang="en-US" baseline="-25000">
+              <a:rPr lang="en-US" altLang="en-US" baseline="-25000">
                 <a:solidFill>
                   <a:schemeClr val="accent1">
                     <a:lumMod val="60000"/>
@@ -13320,11 +13887,11 @@
               <a:t>0</a:t>
             </a:r>
             <a:r>
-              <a:rPr lang="" altLang="en-US"/>
+              <a:rPr lang="en-US" altLang="en-US"/>
               <a:t> V </a:t>
             </a:r>
             <a:r>
-              <a:rPr lang="" altLang="en-US">
+              <a:rPr lang="en-US" altLang="en-US">
                 <a:solidFill>
                   <a:srgbClr val="FFFF00"/>
                 </a:solidFill>
@@ -13332,7 +13899,7 @@
               <a:t>x</a:t>
             </a:r>
             <a:r>
-              <a:rPr lang="" altLang="en-US" baseline="-25000">
+              <a:rPr lang="en-US" altLang="en-US" baseline="-25000">
                 <a:solidFill>
                   <a:srgbClr val="FFFF00"/>
                 </a:solidFill>
@@ -13340,11 +13907,11 @@
               <a:t>1</a:t>
             </a:r>
             <a:r>
-              <a:rPr lang="" altLang="en-US"/>
+              <a:rPr lang="en-US" altLang="en-US"/>
               <a:t> V </a:t>
             </a:r>
             <a:r>
-              <a:rPr lang="" altLang="en-US">
+              <a:rPr lang="en-US" altLang="en-US">
                 <a:solidFill>
                   <a:srgbClr val="FF0000"/>
                 </a:solidFill>
@@ -13352,7 +13919,7 @@
               <a:t>x</a:t>
             </a:r>
             <a:r>
-              <a:rPr lang="" altLang="en-US" baseline="-25000">
+              <a:rPr lang="en-US" altLang="en-US" baseline="-25000">
                 <a:solidFill>
                   <a:srgbClr val="FF0000"/>
                 </a:solidFill>
@@ -13360,11 +13927,11 @@
               <a:t>2</a:t>
             </a:r>
             <a:r>
-              <a:rPr lang="" altLang="en-US"/>
+              <a:rPr lang="en-US" altLang="en-US"/>
               <a:t>) /\ (!</a:t>
             </a:r>
             <a:r>
-              <a:rPr lang="" altLang="en-US">
+              <a:rPr lang="en-US" altLang="en-US">
                 <a:solidFill>
                   <a:schemeClr val="accent1">
                     <a:lumMod val="60000"/>
@@ -13375,7 +13942,7 @@
               <a:t>x</a:t>
             </a:r>
             <a:r>
-              <a:rPr lang="" altLang="en-US" baseline="-25000">
+              <a:rPr lang="en-US" altLang="en-US" baseline="-25000">
                 <a:solidFill>
                   <a:schemeClr val="accent1">
                     <a:lumMod val="60000"/>
@@ -13386,11 +13953,11 @@
               <a:t>0</a:t>
             </a:r>
             <a:r>
-              <a:rPr lang="" altLang="en-US"/>
+              <a:rPr lang="en-US" altLang="en-US"/>
               <a:t> V !</a:t>
             </a:r>
             <a:r>
-              <a:rPr lang="" altLang="en-US">
+              <a:rPr lang="en-US" altLang="en-US">
                 <a:solidFill>
                   <a:srgbClr val="FFFF00"/>
                 </a:solidFill>
@@ -13398,7 +13965,7 @@
               <a:t>x</a:t>
             </a:r>
             <a:r>
-              <a:rPr lang="" altLang="en-US" baseline="-25000">
+              <a:rPr lang="en-US" altLang="en-US" baseline="-25000">
                 <a:solidFill>
                   <a:srgbClr val="FFFF00"/>
                 </a:solidFill>
@@ -13406,7 +13973,7 @@
               <a:t>1</a:t>
             </a:r>
             <a:r>
-              <a:rPr lang="" altLang="en-US">
+              <a:rPr lang="en-US" altLang="en-US">
                 <a:solidFill>
                   <a:srgbClr val="FFFF00"/>
                 </a:solidFill>
@@ -13414,11 +13981,11 @@
               <a:t> </a:t>
             </a:r>
             <a:r>
-              <a:rPr lang="" altLang="en-US"/>
+              <a:rPr lang="en-US" altLang="en-US"/>
               <a:t>V </a:t>
             </a:r>
             <a:r>
-              <a:rPr lang="" altLang="en-US">
+              <a:rPr lang="en-US" altLang="en-US">
                 <a:solidFill>
                   <a:srgbClr val="00B050"/>
                 </a:solidFill>
@@ -13426,7 +13993,7 @@
               <a:t>x</a:t>
             </a:r>
             <a:r>
-              <a:rPr lang="" altLang="en-US" baseline="-25000">
+              <a:rPr lang="en-US" altLang="en-US" baseline="-25000">
                 <a:solidFill>
                   <a:srgbClr val="00B050"/>
                 </a:solidFill>
@@ -13434,11 +14001,11 @@
               <a:t>3</a:t>
             </a:r>
             <a:r>
-              <a:rPr lang="" altLang="en-US"/>
+              <a:rPr lang="en-US" altLang="en-US"/>
               <a:t>) /\ (!</a:t>
             </a:r>
             <a:r>
-              <a:rPr lang="" altLang="en-US">
+              <a:rPr lang="en-US" altLang="en-US">
                 <a:solidFill>
                   <a:schemeClr val="accent1">
                     <a:lumMod val="60000"/>
@@ -13449,7 +14016,7 @@
               <a:t>x</a:t>
             </a:r>
             <a:r>
-              <a:rPr lang="" altLang="en-US" baseline="-25000">
+              <a:rPr lang="en-US" altLang="en-US" baseline="-25000">
                 <a:solidFill>
                   <a:schemeClr val="accent1">
                     <a:lumMod val="60000"/>
@@ -13460,11 +14027,11 @@
               <a:t>0</a:t>
             </a:r>
             <a:r>
-              <a:rPr lang="" altLang="en-US"/>
+              <a:rPr lang="en-US" altLang="en-US"/>
               <a:t> V !</a:t>
             </a:r>
             <a:r>
-              <a:rPr lang="" altLang="en-US">
+              <a:rPr lang="en-US" altLang="en-US">
                 <a:solidFill>
                   <a:srgbClr val="00B050"/>
                 </a:solidFill>
@@ -13472,7 +14039,7 @@
               <a:t>x</a:t>
             </a:r>
             <a:r>
-              <a:rPr lang="" altLang="en-US" baseline="-25000">
+              <a:rPr lang="en-US" altLang="en-US" baseline="-25000">
                 <a:solidFill>
                   <a:srgbClr val="00B050"/>
                 </a:solidFill>
@@ -13480,7 +14047,7 @@
               <a:t>3</a:t>
             </a:r>
             <a:r>
-              <a:rPr lang="" altLang="en-US">
+              <a:rPr lang="en-US" altLang="en-US">
                 <a:solidFill>
                   <a:srgbClr val="00B050"/>
                 </a:solidFill>
@@ -13488,11 +14055,11 @@
               <a:t> </a:t>
             </a:r>
             <a:r>
-              <a:rPr lang="" altLang="en-US"/>
+              <a:rPr lang="en-US" altLang="en-US"/>
               <a:t>V !</a:t>
             </a:r>
             <a:r>
-              <a:rPr lang="" altLang="en-US">
+              <a:rPr lang="en-US" altLang="en-US">
                 <a:solidFill>
                   <a:srgbClr val="FF0000"/>
                 </a:solidFill>
@@ -13500,7 +14067,7 @@
               <a:t>x</a:t>
             </a:r>
             <a:r>
-              <a:rPr lang="" altLang="en-US" baseline="-25000">
+              <a:rPr lang="en-US" altLang="en-US" baseline="-25000">
                 <a:solidFill>
                   <a:srgbClr val="FF0000"/>
                 </a:solidFill>
@@ -13508,17 +14075,17 @@
               <a:t>2</a:t>
             </a:r>
             <a:r>
-              <a:rPr lang="" altLang="en-US"/>
+              <a:rPr lang="en-US" altLang="en-US"/>
               <a:t>)</a:t>
             </a:r>
-            <a:endParaRPr lang="" altLang="en-US"/>
+            <a:endParaRPr lang="en-US" altLang="en-US"/>
           </a:p>
           <a:p>
             <a:pPr marL="114300" indent="0">
               <a:buNone/>
             </a:pPr>
             <a:r>
-              <a:rPr lang="" altLang="en-US">
+              <a:rPr lang="en-US" altLang="en-US">
                 <a:solidFill>
                   <a:schemeClr val="tx1"/>
                 </a:solidFill>
@@ -13526,11 +14093,11 @@
               <a:t>certificado</a:t>
             </a:r>
             <a:r>
-              <a:rPr lang="" altLang="en-US"/>
+              <a:rPr lang="en-US" altLang="en-US"/>
               <a:t> = {</a:t>
             </a:r>
             <a:r>
-              <a:rPr lang="" altLang="en-US">
+              <a:rPr lang="en-US" altLang="en-US">
                 <a:solidFill>
                   <a:schemeClr val="accent1">
                     <a:lumMod val="60000"/>
@@ -13541,11 +14108,11 @@
               <a:t>true</a:t>
             </a:r>
             <a:r>
-              <a:rPr lang="" altLang="en-US"/>
+              <a:rPr lang="en-US" altLang="en-US"/>
               <a:t>, </a:t>
             </a:r>
             <a:r>
-              <a:rPr lang="" altLang="en-US">
+              <a:rPr lang="en-US" altLang="en-US">
                 <a:solidFill>
                   <a:srgbClr val="FFFF00"/>
                 </a:solidFill>
@@ -13553,11 +14120,11 @@
               <a:t>false</a:t>
             </a:r>
             <a:r>
-              <a:rPr lang="" altLang="en-US"/>
+              <a:rPr lang="en-US" altLang="en-US"/>
               <a:t>, </a:t>
             </a:r>
             <a:r>
-              <a:rPr lang="" altLang="en-US">
+              <a:rPr lang="en-US" altLang="en-US">
                 <a:solidFill>
                   <a:srgbClr val="FF0000"/>
                 </a:solidFill>
@@ -13565,11 +14132,11 @@
               <a:t>false</a:t>
             </a:r>
             <a:r>
-              <a:rPr lang="" altLang="en-US"/>
+              <a:rPr lang="en-US" altLang="en-US"/>
               <a:t>, </a:t>
             </a:r>
             <a:r>
-              <a:rPr lang="" altLang="en-US">
+              <a:rPr lang="en-US" altLang="en-US">
                 <a:solidFill>
                   <a:srgbClr val="00B050"/>
                 </a:solidFill>
@@ -13577,36 +14144,36 @@
               <a:t>false</a:t>
             </a:r>
             <a:r>
-              <a:rPr lang="" altLang="en-US"/>
+              <a:rPr lang="en-US" altLang="en-US"/>
               <a:t>}</a:t>
             </a:r>
-            <a:endParaRPr lang="" altLang="en-US"/>
+            <a:endParaRPr lang="en-US" altLang="en-US"/>
           </a:p>
           <a:p>
             <a:pPr marL="114300" indent="0">
               <a:buNone/>
             </a:pPr>
-            <a:endParaRPr lang="" altLang="en-US"/>
+            <a:endParaRPr lang="en-US" altLang="en-US"/>
           </a:p>
           <a:p>
             <a:pPr marL="114300" indent="0">
               <a:buNone/>
             </a:pPr>
-            <a:endParaRPr lang="" altLang="en-US"/>
+            <a:endParaRPr lang="en-US" altLang="en-US"/>
           </a:p>
           <a:p>
             <a:pPr marL="114300" indent="0" algn="ctr">
               <a:buNone/>
             </a:pPr>
             <a:r>
-              <a:rPr lang="" altLang="en-US">
+              <a:rPr lang="en-US" altLang="en-US">
                 <a:solidFill>
                   <a:schemeClr val="tx1"/>
                 </a:solidFill>
               </a:rPr>
               <a:t>(true V false V false) /\ (false V true V false) /\ (false V true V true)</a:t>
             </a:r>
-            <a:endParaRPr lang="" altLang="en-US">
+            <a:endParaRPr lang="en-US" altLang="en-US">
               <a:solidFill>
                 <a:schemeClr val="tx1"/>
               </a:solidFill>
@@ -13617,14 +14184,14 @@
               <a:buNone/>
             </a:pPr>
             <a:r>
-              <a:rPr lang="" altLang="en-US">
+              <a:rPr lang="en-US" altLang="en-US">
                 <a:solidFill>
                   <a:schemeClr val="tx1"/>
                 </a:solidFill>
               </a:rPr>
               <a:t>(true /\ true /\ true)</a:t>
             </a:r>
-            <a:endParaRPr lang="" altLang="en-US">
+            <a:endParaRPr lang="en-US" altLang="en-US">
               <a:solidFill>
                 <a:schemeClr val="tx1"/>
               </a:solidFill>
@@ -13635,14 +14202,14 @@
               <a:buNone/>
             </a:pPr>
             <a:r>
-              <a:rPr lang="" altLang="en-US">
+              <a:rPr lang="en-US" altLang="en-US">
                 <a:solidFill>
                   <a:schemeClr val="tx1"/>
                 </a:solidFill>
               </a:rPr>
               <a:t>true</a:t>
             </a:r>
-            <a:endParaRPr lang="" altLang="en-US">
+            <a:endParaRPr lang="en-US" altLang="en-US">
               <a:solidFill>
                 <a:schemeClr val="tx1"/>
               </a:solidFill>

</xml_diff>